<commit_message>
Modified a few game mechanics, finished the Gantt Chart
</commit_message>
<xml_diff>
--- a/Project 3 Presentation.pptx
+++ b/Project 3 Presentation.pptx
@@ -299,7 +299,7 @@
           <a:p>
             <a:fld id="{2441F8C3-9C52-2E4C-8C31-A314DBA0B4C7}" type="datetimeFigureOut">
               <a:rPr lang="en-US" smtClean="0"/>
-              <a:t>10/31/16</a:t>
+              <a:t>11/1/16</a:t>
             </a:fld>
             <a:endParaRPr lang="en-US"/>
           </a:p>
@@ -499,7 +499,7 @@
           <a:p>
             <a:fld id="{2441F8C3-9C52-2E4C-8C31-A314DBA0B4C7}" type="datetimeFigureOut">
               <a:rPr lang="en-US" smtClean="0"/>
-              <a:t>10/31/16</a:t>
+              <a:t>11/1/16</a:t>
             </a:fld>
             <a:endParaRPr lang="en-US"/>
           </a:p>
@@ -674,7 +674,7 @@
           <a:p>
             <a:fld id="{2441F8C3-9C52-2E4C-8C31-A314DBA0B4C7}" type="datetimeFigureOut">
               <a:rPr lang="en-US" smtClean="0"/>
-              <a:t>10/31/16</a:t>
+              <a:t>11/1/16</a:t>
             </a:fld>
             <a:endParaRPr lang="en-US"/>
           </a:p>
@@ -839,7 +839,7 @@
           <a:p>
             <a:fld id="{2441F8C3-9C52-2E4C-8C31-A314DBA0B4C7}" type="datetimeFigureOut">
               <a:rPr lang="en-US" smtClean="0"/>
-              <a:t>10/31/16</a:t>
+              <a:t>11/1/16</a:t>
             </a:fld>
             <a:endParaRPr lang="en-US"/>
           </a:p>
@@ -1087,7 +1087,7 @@
           <a:p>
             <a:fld id="{2441F8C3-9C52-2E4C-8C31-A314DBA0B4C7}" type="datetimeFigureOut">
               <a:rPr lang="en-US" smtClean="0"/>
-              <a:t>10/31/16</a:t>
+              <a:t>11/1/16</a:t>
             </a:fld>
             <a:endParaRPr lang="en-US"/>
           </a:p>
@@ -1405,7 +1405,7 @@
           <a:p>
             <a:fld id="{2441F8C3-9C52-2E4C-8C31-A314DBA0B4C7}" type="datetimeFigureOut">
               <a:rPr lang="en-US" smtClean="0"/>
-              <a:t>10/31/16</a:t>
+              <a:t>11/1/16</a:t>
             </a:fld>
             <a:endParaRPr lang="en-US"/>
           </a:p>
@@ -1871,7 +1871,7 @@
           <a:p>
             <a:fld id="{2441F8C3-9C52-2E4C-8C31-A314DBA0B4C7}" type="datetimeFigureOut">
               <a:rPr lang="en-US" smtClean="0"/>
-              <a:t>10/31/16</a:t>
+              <a:t>11/1/16</a:t>
             </a:fld>
             <a:endParaRPr lang="en-US"/>
           </a:p>
@@ -2019,7 +2019,7 @@
           <a:p>
             <a:fld id="{2441F8C3-9C52-2E4C-8C31-A314DBA0B4C7}" type="datetimeFigureOut">
               <a:rPr lang="en-US" smtClean="0"/>
-              <a:t>10/31/16</a:t>
+              <a:t>11/1/16</a:t>
             </a:fld>
             <a:endParaRPr lang="en-US"/>
           </a:p>
@@ -2109,7 +2109,7 @@
           <a:p>
             <a:fld id="{2441F8C3-9C52-2E4C-8C31-A314DBA0B4C7}" type="datetimeFigureOut">
               <a:rPr lang="en-US" smtClean="0"/>
-              <a:t>10/31/16</a:t>
+              <a:t>11/1/16</a:t>
             </a:fld>
             <a:endParaRPr lang="en-US"/>
           </a:p>
@@ -2383,7 +2383,7 @@
           <a:p>
             <a:fld id="{2441F8C3-9C52-2E4C-8C31-A314DBA0B4C7}" type="datetimeFigureOut">
               <a:rPr lang="en-US" smtClean="0"/>
-              <a:t>10/31/16</a:t>
+              <a:t>11/1/16</a:t>
             </a:fld>
             <a:endParaRPr lang="en-US"/>
           </a:p>
@@ -2688,7 +2688,7 @@
           <a:p>
             <a:fld id="{2441F8C3-9C52-2E4C-8C31-A314DBA0B4C7}" type="datetimeFigureOut">
               <a:rPr lang="en-US" smtClean="0"/>
-              <a:t>10/31/16</a:t>
+              <a:t>11/1/16</a:t>
             </a:fld>
             <a:endParaRPr lang="en-US"/>
           </a:p>
@@ -2986,7 +2986,7 @@
           <a:p>
             <a:fld id="{2441F8C3-9C52-2E4C-8C31-A314DBA0B4C7}" type="datetimeFigureOut">
               <a:rPr lang="en-US" smtClean="0"/>
-              <a:t>10/31/16</a:t>
+              <a:t>11/1/16</a:t>
             </a:fld>
             <a:endParaRPr lang="en-US"/>
           </a:p>
@@ -4009,13 +4009,7 @@
               <a:rPr lang="en-US" dirty="0" smtClean="0"/>
               <a:t>Plot</a:t>
             </a:r>
-          </a:p>
-          <a:p>
-            <a:r>
-              <a:rPr lang="en-US" dirty="0" smtClean="0"/>
-              <a:t>Witty comments</a:t>
-            </a:r>
-            <a:endParaRPr lang="en-US" dirty="0"/>
+            <a:endParaRPr lang="en-US" dirty="0" smtClean="0"/>
           </a:p>
         </p:txBody>
       </p:sp>

</xml_diff>